<commit_message>
Add Class 3 and new codes
</commit_message>
<xml_diff>
--- a/Aula 02/Aula 02.pptx
+++ b/Aula 02/Aula 02.pptx
@@ -5,7 +5,7 @@
     <p:sldMasterId id="2147483720" r:id="rId1"/>
   </p:sldMasterIdLst>
   <p:notesMasterIdLst>
-    <p:notesMasterId r:id="rId20"/>
+    <p:notesMasterId r:id="rId15"/>
   </p:notesMasterIdLst>
   <p:sldIdLst>
     <p:sldId id="256" r:id="rId2"/>
@@ -20,12 +20,7 @@
     <p:sldId id="268" r:id="rId11"/>
     <p:sldId id="264" r:id="rId12"/>
     <p:sldId id="265" r:id="rId13"/>
-    <p:sldId id="271" r:id="rId14"/>
-    <p:sldId id="272" r:id="rId15"/>
-    <p:sldId id="275" r:id="rId16"/>
-    <p:sldId id="274" r:id="rId17"/>
-    <p:sldId id="273" r:id="rId18"/>
-    <p:sldId id="266" r:id="rId19"/>
+    <p:sldId id="266" r:id="rId14"/>
   </p:sldIdLst>
   <p:sldSz cx="9144000" cy="6858000" type="screen4x3"/>
   <p:notesSz cx="6858000" cy="9144000"/>
@@ -226,7 +221,7 @@
             <a:fld id="{CDA8A7F6-3914-469C-A6E9-40923DB352E9}" type="datetimeFigureOut">
               <a:rPr lang="pt-BR" smtClean="0"/>
               <a:pPr/>
-              <a:t>11/09/2014</a:t>
+              <a:t>22/09/2014</a:t>
             </a:fld>
             <a:endParaRPr lang="pt-BR"/>
           </a:p>
@@ -1123,7 +1118,7 @@
             <a:fld id="{F3B9BC5B-4239-48BA-91AF-B1A90F2D50F7}" type="datetimeFigureOut">
               <a:rPr lang="pt-BR" smtClean="0"/>
               <a:pPr/>
-              <a:t>11/09/2014</a:t>
+              <a:t>22/09/2014</a:t>
             </a:fld>
             <a:endParaRPr lang="pt-BR"/>
           </a:p>
@@ -1321,7 +1316,7 @@
             <a:fld id="{F3B9BC5B-4239-48BA-91AF-B1A90F2D50F7}" type="datetimeFigureOut">
               <a:rPr lang="pt-BR" smtClean="0"/>
               <a:pPr/>
-              <a:t>11/09/2014</a:t>
+              <a:t>22/09/2014</a:t>
             </a:fld>
             <a:endParaRPr lang="pt-BR"/>
           </a:p>
@@ -1508,7 +1503,7 @@
             <a:fld id="{F3B9BC5B-4239-48BA-91AF-B1A90F2D50F7}" type="datetimeFigureOut">
               <a:rPr lang="pt-BR" smtClean="0"/>
               <a:pPr/>
-              <a:t>11/09/2014</a:t>
+              <a:t>22/09/2014</a:t>
             </a:fld>
             <a:endParaRPr lang="pt-BR"/>
           </a:p>
@@ -1660,7 +1655,7 @@
             <a:fld id="{F3B9BC5B-4239-48BA-91AF-B1A90F2D50F7}" type="datetimeFigureOut">
               <a:rPr lang="pt-BR" smtClean="0"/>
               <a:pPr/>
-              <a:t>11/09/2014</a:t>
+              <a:t>22/09/2014</a:t>
             </a:fld>
             <a:endParaRPr lang="pt-BR"/>
           </a:p>
@@ -1917,7 +1912,7 @@
             <a:fld id="{F3B9BC5B-4239-48BA-91AF-B1A90F2D50F7}" type="datetimeFigureOut">
               <a:rPr lang="pt-BR" smtClean="0"/>
               <a:pPr/>
-              <a:t>11/09/2014</a:t>
+              <a:t>22/09/2014</a:t>
             </a:fld>
             <a:endParaRPr lang="pt-BR"/>
           </a:p>
@@ -2328,7 +2323,7 @@
             <a:fld id="{F3B9BC5B-4239-48BA-91AF-B1A90F2D50F7}" type="datetimeFigureOut">
               <a:rPr lang="pt-BR" smtClean="0"/>
               <a:pPr/>
-              <a:t>11/09/2014</a:t>
+              <a:t>22/09/2014</a:t>
             </a:fld>
             <a:endParaRPr lang="pt-BR"/>
           </a:p>
@@ -2776,7 +2771,7 @@
             <a:fld id="{F3B9BC5B-4239-48BA-91AF-B1A90F2D50F7}" type="datetimeFigureOut">
               <a:rPr lang="pt-BR" smtClean="0"/>
               <a:pPr/>
-              <a:t>11/09/2014</a:t>
+              <a:t>22/09/2014</a:t>
             </a:fld>
             <a:endParaRPr lang="pt-BR"/>
           </a:p>
@@ -2879,7 +2874,7 @@
             <a:fld id="{F3B9BC5B-4239-48BA-91AF-B1A90F2D50F7}" type="datetimeFigureOut">
               <a:rPr lang="pt-BR" smtClean="0"/>
               <a:pPr/>
-              <a:t>11/09/2014</a:t>
+              <a:t>22/09/2014</a:t>
             </a:fld>
             <a:endParaRPr lang="pt-BR"/>
           </a:p>
@@ -3002,7 +2997,7 @@
             <a:fld id="{F3B9BC5B-4239-48BA-91AF-B1A90F2D50F7}" type="datetimeFigureOut">
               <a:rPr lang="pt-BR" smtClean="0"/>
               <a:pPr/>
-              <a:t>11/09/2014</a:t>
+              <a:t>22/09/2014</a:t>
             </a:fld>
             <a:endParaRPr lang="pt-BR"/>
           </a:p>
@@ -3278,7 +3273,7 @@
             <a:fld id="{F3B9BC5B-4239-48BA-91AF-B1A90F2D50F7}" type="datetimeFigureOut">
               <a:rPr lang="pt-BR" smtClean="0"/>
               <a:pPr/>
-              <a:t>11/09/2014</a:t>
+              <a:t>22/09/2014</a:t>
             </a:fld>
             <a:endParaRPr lang="pt-BR"/>
           </a:p>
@@ -3485,7 +3480,7 @@
             <a:fld id="{F3B9BC5B-4239-48BA-91AF-B1A90F2D50F7}" type="datetimeFigureOut">
               <a:rPr lang="pt-BR" smtClean="0"/>
               <a:pPr/>
-              <a:t>11/09/2014</a:t>
+              <a:t>22/09/2014</a:t>
             </a:fld>
             <a:endParaRPr lang="pt-BR"/>
           </a:p>
@@ -4596,7 +4591,7 @@
             <a:fld id="{F3B9BC5B-4239-48BA-91AF-B1A90F2D50F7}" type="datetimeFigureOut">
               <a:rPr lang="pt-BR" smtClean="0"/>
               <a:pPr/>
-              <a:t>11/09/2014</a:t>
+              <a:t>22/09/2014</a:t>
             </a:fld>
             <a:endParaRPr lang="pt-BR"/>
           </a:p>
@@ -5052,8 +5047,17 @@
             <a:pPr algn="ctr"/>
             <a:r>
               <a:rPr lang="pt-BR" dirty="0" smtClean="0"/>
-              <a:t>Aula 02 – Evitando obstáculos</a:t>
-            </a:r>
+              <a:t>Aula 02 – </a:t>
+            </a:r>
+            <a:r>
+              <a:rPr lang="pt-BR" dirty="0" smtClean="0"/>
+              <a:t>Andando com o </a:t>
+            </a:r>
+            <a:r>
+              <a:rPr lang="pt-BR" dirty="0" err="1" smtClean="0"/>
+              <a:t>Sparki</a:t>
+            </a:r>
+            <a:endParaRPr lang="pt-BR" dirty="0" smtClean="0"/>
           </a:p>
         </p:txBody>
       </p:sp>
@@ -5644,55 +5648,6 @@
       </p:grpSpPr>
       <p:sp>
         <p:nvSpPr>
-          <p:cNvPr id="3" name="Título 2"/>
-          <p:cNvSpPr>
-            <a:spLocks noGrp="1"/>
-          </p:cNvSpPr>
-          <p:nvPr>
-            <p:ph type="title"/>
-          </p:nvPr>
-        </p:nvSpPr>
-        <p:spPr/>
-        <p:txBody>
-          <a:bodyPr>
-            <a:normAutofit/>
-          </a:bodyPr>
-          <a:lstStyle/>
-          <a:p>
-            <a:r>
-              <a:rPr lang="pt-BR" dirty="0" smtClean="0"/>
-              <a:t>Sensor ultrassônico</a:t>
-            </a:r>
-            <a:endParaRPr lang="pt-BR" dirty="0"/>
-          </a:p>
-        </p:txBody>
-      </p:sp>
-      <p:pic>
-        <p:nvPicPr>
-          <p:cNvPr id="5" name="Imagem 4" descr="ras-logo.png"/>
-          <p:cNvPicPr>
-            <a:picLocks noChangeAspect="1"/>
-          </p:cNvPicPr>
-          <p:nvPr/>
-        </p:nvPicPr>
-        <p:blipFill>
-          <a:blip r:embed="rId2" cstate="print"/>
-          <a:stretch>
-            <a:fillRect/>
-          </a:stretch>
-        </p:blipFill>
-        <p:spPr>
-          <a:xfrm>
-            <a:off x="0" y="6121079"/>
-            <a:ext cx="1115615" cy="736921"/>
-          </a:xfrm>
-          <a:prstGeom prst="rect">
-            <a:avLst/>
-          </a:prstGeom>
-        </p:spPr>
-      </p:pic>
-      <p:sp>
-        <p:nvSpPr>
           <p:cNvPr id="2" name="Espaço Reservado para Conteúdo 1"/>
           <p:cNvSpPr>
             <a:spLocks noGrp="1"/>
@@ -5708,766 +5663,24 @@
           <a:p>
             <a:endParaRPr lang="pt-BR" dirty="0"/>
           </a:p>
-        </p:txBody>
-      </p:sp>
-      <p:pic>
-        <p:nvPicPr>
-          <p:cNvPr id="6" name="Picture 2" descr="Ultrasonic Identify"/>
-          <p:cNvPicPr>
-            <a:picLocks noChangeAspect="1" noChangeArrowheads="1"/>
-          </p:cNvPicPr>
-          <p:nvPr/>
-        </p:nvPicPr>
-        <p:blipFill>
-          <a:blip r:embed="rId3">
-            <a:extLst>
-              <a:ext uri="{28A0092B-C50C-407E-A947-70E740481C1C}">
-                <a14:useLocalDpi xmlns:a14="http://schemas.microsoft.com/office/drawing/2010/main" val="0"/>
-              </a:ext>
-            </a:extLst>
-          </a:blip>
-          <a:srcRect/>
-          <a:stretch>
-            <a:fillRect/>
-          </a:stretch>
-        </p:blipFill>
-        <p:spPr bwMode="auto">
-          <a:xfrm>
-            <a:off x="395536" y="2110420"/>
-            <a:ext cx="4807907" cy="2387927"/>
-          </a:xfrm>
-          <a:prstGeom prst="rect">
-            <a:avLst/>
-          </a:prstGeom>
-          <a:noFill/>
-          <a:extLst>
-            <a:ext uri="{909E8E84-426E-40DD-AFC4-6F175D3DCCD1}">
-              <a14:hiddenFill xmlns:a14="http://schemas.microsoft.com/office/drawing/2010/main">
-                <a:solidFill>
-                  <a:srgbClr val="FFFFFF"/>
-                </a:solidFill>
-              </a14:hiddenFill>
-            </a:ext>
-          </a:extLst>
-        </p:spPr>
-      </p:pic>
-      <p:pic>
-        <p:nvPicPr>
-          <p:cNvPr id="7" name="Picture 4" descr="Ultrasonic Cone"/>
-          <p:cNvPicPr>
-            <a:picLocks noChangeAspect="1" noChangeArrowheads="1"/>
-          </p:cNvPicPr>
-          <p:nvPr/>
-        </p:nvPicPr>
-        <p:blipFill>
-          <a:blip r:embed="rId4">
-            <a:extLst>
-              <a:ext uri="{28A0092B-C50C-407E-A947-70E740481C1C}">
-                <a14:useLocalDpi xmlns:a14="http://schemas.microsoft.com/office/drawing/2010/main" val="0"/>
-              </a:ext>
-            </a:extLst>
-          </a:blip>
-          <a:srcRect/>
-          <a:stretch>
-            <a:fillRect/>
-          </a:stretch>
-        </p:blipFill>
-        <p:spPr bwMode="auto">
-          <a:xfrm>
-            <a:off x="5652120" y="2106294"/>
-            <a:ext cx="3353345" cy="2392053"/>
-          </a:xfrm>
-          <a:prstGeom prst="rect">
-            <a:avLst/>
-          </a:prstGeom>
-          <a:noFill/>
-          <a:extLst>
-            <a:ext uri="{909E8E84-426E-40DD-AFC4-6F175D3DCCD1}">
-              <a14:hiddenFill xmlns:a14="http://schemas.microsoft.com/office/drawing/2010/main">
-                <a:solidFill>
-                  <a:srgbClr val="FFFFFF"/>
-                </a:solidFill>
-              </a14:hiddenFill>
-            </a:ext>
-          </a:extLst>
-        </p:spPr>
-      </p:pic>
-    </p:spTree>
-    <p:extLst>
-      <p:ext uri="{BB962C8B-B14F-4D97-AF65-F5344CB8AC3E}">
-        <p14:creationId xmlns:p14="http://schemas.microsoft.com/office/powerpoint/2010/main" val="1947713265"/>
-      </p:ext>
-    </p:extLst>
-  </p:cSld>
-  <p:clrMapOvr>
-    <a:masterClrMapping/>
-  </p:clrMapOvr>
-  <p:timing>
-    <p:tnLst>
-      <p:par>
-        <p:cTn id="1" dur="indefinite" restart="never" nodeType="tmRoot"/>
-      </p:par>
-    </p:tnLst>
-  </p:timing>
-</p:sld>
-</file>
-
-<file path=ppt/slides/slide14.xml><?xml version="1.0" encoding="utf-8"?>
-<p:sld xmlns:a="http://schemas.openxmlformats.org/drawingml/2006/main" xmlns:r="http://schemas.openxmlformats.org/officeDocument/2006/relationships" xmlns:p="http://schemas.openxmlformats.org/presentationml/2006/main">
-  <p:cSld>
-    <p:spTree>
-      <p:nvGrpSpPr>
-        <p:cNvPr id="1" name=""/>
-        <p:cNvGrpSpPr/>
-        <p:nvPr/>
-      </p:nvGrpSpPr>
-      <p:grpSpPr>
-        <a:xfrm>
-          <a:off x="0" y="0"/>
-          <a:ext cx="0" cy="0"/>
-          <a:chOff x="0" y="0"/>
-          <a:chExt cx="0" cy="0"/>
-        </a:xfrm>
-      </p:grpSpPr>
-      <p:sp>
-        <p:nvSpPr>
-          <p:cNvPr id="3" name="Título 2"/>
-          <p:cNvSpPr>
-            <a:spLocks noGrp="1"/>
-          </p:cNvSpPr>
-          <p:nvPr>
-            <p:ph type="title"/>
-          </p:nvPr>
-        </p:nvSpPr>
-        <p:spPr/>
-        <p:txBody>
-          <a:bodyPr>
-            <a:normAutofit fontScale="90000"/>
-          </a:bodyPr>
-          <a:lstStyle/>
+          <a:p>
+            <a:endParaRPr lang="pt-BR" dirty="0" smtClean="0"/>
+          </a:p>
+          <a:p>
+            <a:endParaRPr lang="pt-BR" dirty="0" smtClean="0"/>
+          </a:p>
           <a:p>
             <a:r>
               <a:rPr lang="pt-BR" dirty="0" smtClean="0"/>
-              <a:t>Sensor ultrass</a:t>
-            </a:r>
-            <a:r>
-              <a:rPr lang="pt-BR" dirty="0" smtClean="0"/>
-              <a:t>ônico – único comando</a:t>
-            </a:r>
-            <a:endParaRPr lang="pt-BR" dirty="0"/>
-          </a:p>
-        </p:txBody>
-      </p:sp>
-      <p:pic>
-        <p:nvPicPr>
-          <p:cNvPr id="5" name="Imagem 4" descr="ras-logo.png"/>
-          <p:cNvPicPr>
-            <a:picLocks noChangeAspect="1"/>
-          </p:cNvPicPr>
-          <p:nvPr/>
-        </p:nvPicPr>
-        <p:blipFill>
-          <a:blip r:embed="rId2" cstate="print"/>
-          <a:stretch>
-            <a:fillRect/>
-          </a:stretch>
-        </p:blipFill>
-        <p:spPr>
-          <a:xfrm>
-            <a:off x="0" y="6121079"/>
-            <a:ext cx="1115615" cy="736921"/>
-          </a:xfrm>
-          <a:prstGeom prst="rect">
-            <a:avLst/>
-          </a:prstGeom>
-        </p:spPr>
-      </p:pic>
-      <p:sp>
-        <p:nvSpPr>
-          <p:cNvPr id="2" name="Espaço Reservado para Conteúdo 1"/>
-          <p:cNvSpPr>
-            <a:spLocks noGrp="1"/>
-          </p:cNvSpPr>
-          <p:nvPr>
-            <p:ph idx="1"/>
-          </p:nvPr>
-        </p:nvSpPr>
-        <p:spPr/>
-        <p:txBody>
-          <a:bodyPr/>
-          <a:lstStyle/>
-          <a:p>
-            <a:endParaRPr lang="pt-BR" dirty="0" smtClean="0"/>
-          </a:p>
-          <a:p>
-            <a:endParaRPr lang="pt-BR" dirty="0"/>
-          </a:p>
-          <a:p>
-            <a:r>
-              <a:rPr lang="pt-BR" dirty="0" err="1"/>
-              <a:t>sparki.ping</a:t>
-            </a:r>
-            <a:r>
-              <a:rPr lang="pt-BR" dirty="0"/>
-              <a:t>() -&gt; retorna distância medida em centímetros</a:t>
-            </a:r>
-          </a:p>
-          <a:p>
-            <a:endParaRPr lang="pt-BR" dirty="0"/>
-          </a:p>
-        </p:txBody>
-      </p:sp>
-    </p:spTree>
-    <p:extLst>
-      <p:ext uri="{BB962C8B-B14F-4D97-AF65-F5344CB8AC3E}">
-        <p14:creationId xmlns:p14="http://schemas.microsoft.com/office/powerpoint/2010/main" val="4293715000"/>
-      </p:ext>
-    </p:extLst>
-  </p:cSld>
-  <p:clrMapOvr>
-    <a:masterClrMapping/>
-  </p:clrMapOvr>
-  <p:timing>
-    <p:tnLst>
-      <p:par>
-        <p:cTn id="1" dur="indefinite" restart="never" nodeType="tmRoot"/>
-      </p:par>
-    </p:tnLst>
-  </p:timing>
-</p:sld>
-</file>
-
-<file path=ppt/slides/slide15.xml><?xml version="1.0" encoding="utf-8"?>
-<p:sld xmlns:a="http://schemas.openxmlformats.org/drawingml/2006/main" xmlns:r="http://schemas.openxmlformats.org/officeDocument/2006/relationships" xmlns:p="http://schemas.openxmlformats.org/presentationml/2006/main">
-  <p:cSld>
-    <p:spTree>
-      <p:nvGrpSpPr>
-        <p:cNvPr id="1" name=""/>
-        <p:cNvGrpSpPr/>
-        <p:nvPr/>
-      </p:nvGrpSpPr>
-      <p:grpSpPr>
-        <a:xfrm>
-          <a:off x="0" y="0"/>
-          <a:ext cx="0" cy="0"/>
-          <a:chOff x="0" y="0"/>
-          <a:chExt cx="0" cy="0"/>
-        </a:xfrm>
-      </p:grpSpPr>
-      <p:sp>
-        <p:nvSpPr>
-          <p:cNvPr id="3" name="Título 2"/>
-          <p:cNvSpPr>
-            <a:spLocks noGrp="1"/>
-          </p:cNvSpPr>
-          <p:nvPr>
-            <p:ph type="title"/>
-          </p:nvPr>
-        </p:nvSpPr>
-        <p:spPr/>
-        <p:txBody>
-          <a:bodyPr>
-            <a:normAutofit fontScale="90000"/>
-          </a:bodyPr>
-          <a:lstStyle/>
-          <a:p>
-            <a:r>
-              <a:rPr lang="pt-BR" dirty="0" smtClean="0"/>
-              <a:t>Servo motor – o pescoço do </a:t>
+              <a:t>Evitando obstáculos com o </a:t>
             </a:r>
             <a:r>
               <a:rPr lang="pt-BR" dirty="0" err="1" smtClean="0"/>
               <a:t>Sparki</a:t>
             </a:r>
-            <a:endParaRPr lang="pt-BR" dirty="0"/>
-          </a:p>
-        </p:txBody>
-      </p:sp>
-      <p:pic>
-        <p:nvPicPr>
-          <p:cNvPr id="5" name="Imagem 4" descr="ras-logo.png"/>
-          <p:cNvPicPr>
-            <a:picLocks noChangeAspect="1"/>
-          </p:cNvPicPr>
-          <p:nvPr/>
-        </p:nvPicPr>
-        <p:blipFill>
-          <a:blip r:embed="rId2" cstate="print"/>
-          <a:stretch>
-            <a:fillRect/>
-          </a:stretch>
-        </p:blipFill>
-        <p:spPr>
-          <a:xfrm>
-            <a:off x="0" y="6121079"/>
-            <a:ext cx="1115615" cy="736921"/>
-          </a:xfrm>
-          <a:prstGeom prst="rect">
-            <a:avLst/>
-          </a:prstGeom>
-        </p:spPr>
-      </p:pic>
-      <p:sp>
-        <p:nvSpPr>
-          <p:cNvPr id="2" name="Espaço Reservado para Conteúdo 1"/>
-          <p:cNvSpPr>
-            <a:spLocks noGrp="1"/>
-          </p:cNvSpPr>
-          <p:nvPr>
-            <p:ph idx="1"/>
-          </p:nvPr>
-        </p:nvSpPr>
-        <p:spPr/>
-        <p:txBody>
-          <a:bodyPr/>
-          <a:lstStyle/>
-          <a:p>
-            <a:endParaRPr lang="pt-BR" dirty="0" smtClean="0"/>
-          </a:p>
-          <a:p>
-            <a:endParaRPr lang="pt-BR" dirty="0"/>
-          </a:p>
-          <a:p>
-            <a:r>
-              <a:rPr lang="pt-BR" dirty="0" err="1"/>
-              <a:t>sparki.servo</a:t>
-            </a:r>
-            <a:r>
-              <a:rPr lang="pt-BR" dirty="0"/>
-              <a:t>(</a:t>
-            </a:r>
-            <a:r>
-              <a:rPr lang="pt-BR" dirty="0" err="1"/>
-              <a:t>angulo_em_graus</a:t>
-            </a:r>
-            <a:r>
-              <a:rPr lang="pt-BR" dirty="0"/>
-              <a:t>) -&gt; utilizar </a:t>
-            </a:r>
             <a:r>
               <a:rPr lang="pt-BR" dirty="0" smtClean="0"/>
-              <a:t>valores de -80 até</a:t>
-            </a:r>
-            <a:r>
-              <a:rPr lang="pt-BR" dirty="0"/>
-              <a:t>, no máximo, 80, para evitar </a:t>
-            </a:r>
-            <a:r>
-              <a:rPr lang="pt-BR" dirty="0" smtClean="0"/>
-              <a:t>que o sensor encoste na tela de LCD e force o motor.</a:t>
-            </a:r>
-            <a:endParaRPr lang="pt-BR" dirty="0"/>
-          </a:p>
-          <a:p>
-            <a:endParaRPr lang="pt-BR" dirty="0"/>
-          </a:p>
-        </p:txBody>
-      </p:sp>
-    </p:spTree>
-    <p:extLst>
-      <p:ext uri="{BB962C8B-B14F-4D97-AF65-F5344CB8AC3E}">
-        <p14:creationId xmlns:p14="http://schemas.microsoft.com/office/powerpoint/2010/main" val="4148322153"/>
-      </p:ext>
-    </p:extLst>
-  </p:cSld>
-  <p:clrMapOvr>
-    <a:masterClrMapping/>
-  </p:clrMapOvr>
-  <p:timing>
-    <p:tnLst>
-      <p:par>
-        <p:cTn id="1" dur="indefinite" restart="never" nodeType="tmRoot"/>
-      </p:par>
-    </p:tnLst>
-  </p:timing>
-</p:sld>
-</file>
-
-<file path=ppt/slides/slide16.xml><?xml version="1.0" encoding="utf-8"?>
-<p:sld xmlns:a="http://schemas.openxmlformats.org/drawingml/2006/main" xmlns:r="http://schemas.openxmlformats.org/officeDocument/2006/relationships" xmlns:p="http://schemas.openxmlformats.org/presentationml/2006/main">
-  <p:cSld>
-    <p:spTree>
-      <p:nvGrpSpPr>
-        <p:cNvPr id="1" name=""/>
-        <p:cNvGrpSpPr/>
-        <p:nvPr/>
-      </p:nvGrpSpPr>
-      <p:grpSpPr>
-        <a:xfrm>
-          <a:off x="0" y="0"/>
-          <a:ext cx="0" cy="0"/>
-          <a:chOff x="0" y="0"/>
-          <a:chExt cx="0" cy="0"/>
-        </a:xfrm>
-      </p:grpSpPr>
-      <p:sp>
-        <p:nvSpPr>
-          <p:cNvPr id="3" name="Título 2"/>
-          <p:cNvSpPr>
-            <a:spLocks noGrp="1"/>
-          </p:cNvSpPr>
-          <p:nvPr>
-            <p:ph type="title"/>
-          </p:nvPr>
-        </p:nvSpPr>
-        <p:spPr/>
-        <p:txBody>
-          <a:bodyPr>
-            <a:normAutofit/>
-          </a:bodyPr>
-          <a:lstStyle/>
-          <a:p>
-            <a:r>
-              <a:rPr lang="pt-BR" dirty="0" smtClean="0"/>
-              <a:t>Revisando – tela de LCD</a:t>
-            </a:r>
-            <a:endParaRPr lang="pt-BR" dirty="0"/>
-          </a:p>
-        </p:txBody>
-      </p:sp>
-      <p:pic>
-        <p:nvPicPr>
-          <p:cNvPr id="5" name="Imagem 4" descr="ras-logo.png"/>
-          <p:cNvPicPr>
-            <a:picLocks noChangeAspect="1"/>
-          </p:cNvPicPr>
-          <p:nvPr/>
-        </p:nvPicPr>
-        <p:blipFill>
-          <a:blip r:embed="rId2" cstate="print"/>
-          <a:stretch>
-            <a:fillRect/>
-          </a:stretch>
-        </p:blipFill>
-        <p:spPr>
-          <a:xfrm>
-            <a:off x="0" y="6121079"/>
-            <a:ext cx="1115615" cy="736921"/>
-          </a:xfrm>
-          <a:prstGeom prst="rect">
-            <a:avLst/>
-          </a:prstGeom>
-        </p:spPr>
-      </p:pic>
-      <p:sp>
-        <p:nvSpPr>
-          <p:cNvPr id="2" name="Espaço Reservado para Conteúdo 1"/>
-          <p:cNvSpPr>
-            <a:spLocks noGrp="1"/>
-          </p:cNvSpPr>
-          <p:nvPr>
-            <p:ph idx="1"/>
-          </p:nvPr>
-        </p:nvSpPr>
-        <p:spPr/>
-        <p:txBody>
-          <a:bodyPr/>
-          <a:lstStyle/>
-          <a:p>
-            <a:endParaRPr lang="pt-BR" dirty="0" smtClean="0"/>
-          </a:p>
-          <a:p>
-            <a:r>
-              <a:rPr lang="pt-BR" dirty="0" err="1" smtClean="0"/>
-              <a:t>sparki.clearLCD</a:t>
-            </a:r>
-            <a:r>
-              <a:rPr lang="pt-BR" dirty="0"/>
-              <a:t>() -&gt; limpa a </a:t>
-            </a:r>
-            <a:r>
-              <a:rPr lang="pt-BR" dirty="0" smtClean="0"/>
-              <a:t>tela</a:t>
-            </a:r>
-          </a:p>
-          <a:p>
-            <a:r>
-              <a:rPr lang="pt-BR" dirty="0" err="1" smtClean="0"/>
-              <a:t>sparki.print</a:t>
-            </a:r>
-            <a:r>
-              <a:rPr lang="pt-BR" dirty="0" smtClean="0"/>
-              <a:t> </a:t>
-            </a:r>
-            <a:r>
-              <a:rPr lang="pt-BR" dirty="0"/>
-              <a:t>(“meu texto”) ou </a:t>
-            </a:r>
-            <a:r>
-              <a:rPr lang="pt-BR" dirty="0" err="1"/>
-              <a:t>sparki.print</a:t>
-            </a:r>
-            <a:r>
-              <a:rPr lang="pt-BR" dirty="0"/>
-              <a:t>(</a:t>
-            </a:r>
-            <a:r>
-              <a:rPr lang="pt-BR" dirty="0" err="1"/>
-              <a:t>variavel</a:t>
-            </a:r>
-            <a:r>
-              <a:rPr lang="pt-BR" dirty="0"/>
-              <a:t>) -&gt; </a:t>
-            </a:r>
-            <a:r>
-              <a:rPr lang="pt-BR" dirty="0" smtClean="0"/>
-              <a:t>prepara o conteúdo para ser mostrado na tela. Não há </a:t>
-            </a:r>
-            <a:r>
-              <a:rPr lang="pt-BR" dirty="0"/>
-              <a:t>quebra </a:t>
-            </a:r>
-            <a:r>
-              <a:rPr lang="pt-BR" dirty="0" smtClean="0"/>
-              <a:t>de </a:t>
-            </a:r>
-            <a:r>
-              <a:rPr lang="pt-BR" dirty="0"/>
-              <a:t>linha</a:t>
-            </a:r>
-          </a:p>
-          <a:p>
-            <a:r>
-              <a:rPr lang="pt-BR" dirty="0"/>
-              <a:t>Para quebrar linha, utilize </a:t>
-            </a:r>
-            <a:r>
-              <a:rPr lang="pt-BR" dirty="0" err="1"/>
-              <a:t>sparki.println</a:t>
-            </a:r>
-            <a:r>
-              <a:rPr lang="pt-BR" dirty="0"/>
-              <a:t>(“meu texto”) ou </a:t>
-            </a:r>
-            <a:r>
-              <a:rPr lang="pt-BR" dirty="0" err="1" smtClean="0"/>
-              <a:t>sparki.println</a:t>
-            </a:r>
-            <a:r>
-              <a:rPr lang="pt-BR" dirty="0" smtClean="0"/>
-              <a:t>(variável).</a:t>
-            </a:r>
-            <a:endParaRPr lang="pt-BR" dirty="0"/>
-          </a:p>
-          <a:p>
-            <a:r>
-              <a:rPr lang="pt-BR" dirty="0" err="1" smtClean="0"/>
-              <a:t>sparki.updateLCD</a:t>
-            </a:r>
-            <a:r>
-              <a:rPr lang="pt-BR" dirty="0"/>
-              <a:t>() -&gt; imprime na tela</a:t>
-            </a:r>
-          </a:p>
-          <a:p>
-            <a:endParaRPr lang="pt-BR" dirty="0"/>
-          </a:p>
-        </p:txBody>
-      </p:sp>
-    </p:spTree>
-    <p:extLst>
-      <p:ext uri="{BB962C8B-B14F-4D97-AF65-F5344CB8AC3E}">
-        <p14:creationId xmlns:p14="http://schemas.microsoft.com/office/powerpoint/2010/main" val="949713943"/>
-      </p:ext>
-    </p:extLst>
-  </p:cSld>
-  <p:clrMapOvr>
-    <a:masterClrMapping/>
-  </p:clrMapOvr>
-  <p:timing>
-    <p:tnLst>
-      <p:par>
-        <p:cTn id="1" dur="indefinite" restart="never" nodeType="tmRoot"/>
-      </p:par>
-    </p:tnLst>
-  </p:timing>
-</p:sld>
-</file>
-
-<file path=ppt/slides/slide17.xml><?xml version="1.0" encoding="utf-8"?>
-<p:sld xmlns:a="http://schemas.openxmlformats.org/drawingml/2006/main" xmlns:r="http://schemas.openxmlformats.org/officeDocument/2006/relationships" xmlns:p="http://schemas.openxmlformats.org/presentationml/2006/main">
-  <p:cSld>
-    <p:spTree>
-      <p:nvGrpSpPr>
-        <p:cNvPr id="1" name=""/>
-        <p:cNvGrpSpPr/>
-        <p:nvPr/>
-      </p:nvGrpSpPr>
-      <p:grpSpPr>
-        <a:xfrm>
-          <a:off x="0" y="0"/>
-          <a:ext cx="0" cy="0"/>
-          <a:chOff x="0" y="0"/>
-          <a:chExt cx="0" cy="0"/>
-        </a:xfrm>
-      </p:grpSpPr>
-      <p:sp>
-        <p:nvSpPr>
-          <p:cNvPr id="3" name="Título 2"/>
-          <p:cNvSpPr>
-            <a:spLocks noGrp="1"/>
-          </p:cNvSpPr>
-          <p:nvPr>
-            <p:ph type="title"/>
-          </p:nvPr>
-        </p:nvSpPr>
-        <p:spPr/>
-        <p:txBody>
-          <a:bodyPr>
-            <a:normAutofit/>
-          </a:bodyPr>
-          <a:lstStyle/>
-          <a:p>
-            <a:r>
-              <a:rPr lang="pt-BR" dirty="0" smtClean="0"/>
-              <a:t>Projeto de hoje</a:t>
-            </a:r>
-            <a:endParaRPr lang="pt-BR" dirty="0"/>
-          </a:p>
-        </p:txBody>
-      </p:sp>
-      <p:pic>
-        <p:nvPicPr>
-          <p:cNvPr id="5" name="Imagem 4" descr="ras-logo.png"/>
-          <p:cNvPicPr>
-            <a:picLocks noChangeAspect="1"/>
-          </p:cNvPicPr>
-          <p:nvPr/>
-        </p:nvPicPr>
-        <p:blipFill>
-          <a:blip r:embed="rId2" cstate="print"/>
-          <a:stretch>
-            <a:fillRect/>
-          </a:stretch>
-        </p:blipFill>
-        <p:spPr>
-          <a:xfrm>
-            <a:off x="0" y="6121079"/>
-            <a:ext cx="1115615" cy="736921"/>
-          </a:xfrm>
-          <a:prstGeom prst="rect">
-            <a:avLst/>
-          </a:prstGeom>
-        </p:spPr>
-      </p:pic>
-      <p:sp>
-        <p:nvSpPr>
-          <p:cNvPr id="2" name="Espaço Reservado para Conteúdo 1"/>
-          <p:cNvSpPr>
-            <a:spLocks noGrp="1"/>
-          </p:cNvSpPr>
-          <p:nvPr>
-            <p:ph idx="1"/>
-          </p:nvPr>
-        </p:nvSpPr>
-        <p:spPr/>
-        <p:txBody>
-          <a:bodyPr/>
-          <a:lstStyle/>
-          <a:p>
-            <a:r>
-              <a:rPr lang="pt-BR" dirty="0" smtClean="0"/>
-              <a:t>Faça um robô que desvia dos obstáculos.</a:t>
-            </a:r>
-          </a:p>
-          <a:p>
-            <a:r>
-              <a:rPr lang="pt-BR" dirty="0" smtClean="0"/>
-              <a:t>Utilize o sensor ultrassônico para medir as distâncias.</a:t>
-            </a:r>
-          </a:p>
-          <a:p>
-            <a:r>
-              <a:rPr lang="pt-BR" dirty="0" smtClean="0"/>
-              <a:t>Se o valor medido for pequeno (ou seja, há um obstáculo), faça o robô olhar para os dois lados e medir as distâncias.</a:t>
-            </a:r>
-          </a:p>
-          <a:p>
-            <a:r>
-              <a:rPr lang="pt-BR" dirty="0" smtClean="0"/>
-              <a:t>Então, o robô deve ir para o lado que tem mais espaço (maior distância medida).</a:t>
-            </a:r>
-          </a:p>
-          <a:p>
-            <a:r>
-              <a:rPr lang="pt-BR" dirty="0" smtClean="0"/>
-              <a:t>Solução proposta: aula_02_cod_4.ino</a:t>
-            </a:r>
-          </a:p>
-        </p:txBody>
-      </p:sp>
-    </p:spTree>
-    <p:extLst>
-      <p:ext uri="{BB962C8B-B14F-4D97-AF65-F5344CB8AC3E}">
-        <p14:creationId xmlns:p14="http://schemas.microsoft.com/office/powerpoint/2010/main" val="2762932399"/>
-      </p:ext>
-    </p:extLst>
-  </p:cSld>
-  <p:clrMapOvr>
-    <a:masterClrMapping/>
-  </p:clrMapOvr>
-  <p:timing>
-    <p:tnLst>
-      <p:par>
-        <p:cTn id="1" dur="indefinite" restart="never" nodeType="tmRoot"/>
-      </p:par>
-    </p:tnLst>
-  </p:timing>
-</p:sld>
-</file>
-
-<file path=ppt/slides/slide18.xml><?xml version="1.0" encoding="utf-8"?>
-<p:sld xmlns:a="http://schemas.openxmlformats.org/drawingml/2006/main" xmlns:r="http://schemas.openxmlformats.org/officeDocument/2006/relationships" xmlns:p="http://schemas.openxmlformats.org/presentationml/2006/main">
-  <p:cSld>
-    <p:spTree>
-      <p:nvGrpSpPr>
-        <p:cNvPr id="1" name=""/>
-        <p:cNvGrpSpPr/>
-        <p:nvPr/>
-      </p:nvGrpSpPr>
-      <p:grpSpPr>
-        <a:xfrm>
-          <a:off x="0" y="0"/>
-          <a:ext cx="0" cy="0"/>
-          <a:chOff x="0" y="0"/>
-          <a:chExt cx="0" cy="0"/>
-        </a:xfrm>
-      </p:grpSpPr>
-      <p:sp>
-        <p:nvSpPr>
-          <p:cNvPr id="2" name="Espaço Reservado para Conteúdo 1"/>
-          <p:cNvSpPr>
-            <a:spLocks noGrp="1"/>
-          </p:cNvSpPr>
-          <p:nvPr>
-            <p:ph idx="1"/>
-          </p:nvPr>
-        </p:nvSpPr>
-        <p:spPr/>
-        <p:txBody>
-          <a:bodyPr/>
-          <a:lstStyle/>
-          <a:p>
-            <a:endParaRPr lang="pt-BR" dirty="0"/>
-          </a:p>
-          <a:p>
-            <a:endParaRPr lang="pt-BR" dirty="0" smtClean="0"/>
-          </a:p>
-          <a:p>
-            <a:endParaRPr lang="pt-BR" dirty="0" smtClean="0"/>
-          </a:p>
-          <a:p>
-            <a:r>
-              <a:rPr lang="pt-BR" dirty="0" smtClean="0"/>
-              <a:t>Controlando o </a:t>
-            </a:r>
-            <a:r>
-              <a:rPr lang="pt-BR" dirty="0" err="1" smtClean="0"/>
-              <a:t>Sparki</a:t>
-            </a:r>
-            <a:r>
-              <a:rPr lang="pt-BR" dirty="0" smtClean="0"/>
-              <a:t> com um controle remoto!</a:t>
+              <a:t>!</a:t>
             </a:r>
             <a:endParaRPr lang="pt-BR" dirty="0" smtClean="0"/>
           </a:p>
@@ -6750,11 +5963,7 @@
           <a:p>
             <a:r>
               <a:rPr lang="pt-BR" dirty="0" smtClean="0"/>
-              <a:t>Direção </a:t>
-            </a:r>
-            <a:r>
-              <a:rPr lang="pt-BR" dirty="0" smtClean="0"/>
-              <a:t>diferencial – dois motores de passo</a:t>
+              <a:t>Direção diferencial – dois motores de passo</a:t>
             </a:r>
             <a:endParaRPr lang="pt-BR" dirty="0"/>
           </a:p>
@@ -7556,7 +6765,6 @@
               <a:rPr lang="pt-BR" dirty="0" smtClean="0"/>
               <a:t>b</a:t>
             </a:r>
-            <a:endParaRPr lang="pt-BR" dirty="0" smtClean="0"/>
           </a:p>
           <a:p>
             <a:endParaRPr lang="pt-BR" dirty="0"/>
@@ -7613,7 +6821,6 @@
               <a:rPr lang="pt-BR" dirty="0"/>
               <a:t> - atividades</a:t>
             </a:r>
-            <a:endParaRPr lang="pt-BR" dirty="0"/>
           </a:p>
         </p:txBody>
       </p:sp>

</xml_diff>